<commit_message>
more complete summary, code reruns
</commit_message>
<xml_diff>
--- a/Visual Summary of Implementations.pptx
+++ b/Visual Summary of Implementations.pptx
@@ -9,8 +9,10 @@
     <p:sldId id="257" r:id="rId3"/>
     <p:sldId id="259" r:id="rId4"/>
     <p:sldId id="263" r:id="rId5"/>
-    <p:sldId id="260" r:id="rId6"/>
-    <p:sldId id="264" r:id="rId7"/>
+    <p:sldId id="265" r:id="rId6"/>
+    <p:sldId id="266" r:id="rId7"/>
+    <p:sldId id="260" r:id="rId8"/>
+    <p:sldId id="264" r:id="rId9"/>
   </p:sldIdLst>
   <p:sldSz cx="12192000" cy="6858000"/>
   <p:notesSz cx="6858000" cy="9144000"/>
@@ -109,6 +111,11 @@
       </a:defRPr>
     </a:lvl9pPr>
   </p:defaultTextStyle>
+  <p:extLst>
+    <p:ext uri="{EFAFB233-063F-42B5-8137-9DF3F51BA10A}">
+      <p15:sldGuideLst xmlns:p15="http://schemas.microsoft.com/office/powerpoint/2012/main"/>
+    </p:ext>
+  </p:extLst>
 </p:presentation>
 </file>
 
@@ -4324,7 +4331,7 @@
           <a:p>
             <a:r>
               <a:rPr lang="en-US" dirty="0" smtClean="0"/>
-              <a:t>Support Vector Machine - Iris</a:t>
+              <a:t>K Nearest Summed Distance</a:t>
             </a:r>
             <a:endParaRPr lang="en-US" dirty="0"/>
           </a:p>
@@ -4348,17 +4355,47 @@
         </p:blipFill>
         <p:spPr>
           <a:xfrm>
-            <a:off x="168198" y="1857020"/>
-            <a:ext cx="5571007" cy="3313703"/>
+            <a:off x="1097280" y="1840884"/>
+            <a:ext cx="4800123" cy="3301271"/>
           </a:xfrm>
           <a:prstGeom prst="rect">
             <a:avLst/>
           </a:prstGeom>
         </p:spPr>
       </p:pic>
+      <p:sp>
+        <p:nvSpPr>
+          <p:cNvPr id="5" name="TextBox 4"/>
+          <p:cNvSpPr txBox="1"/>
+          <p:nvPr/>
+        </p:nvSpPr>
+        <p:spPr>
+          <a:xfrm>
+            <a:off x="1823421" y="5427233"/>
+            <a:ext cx="3560781" cy="369332"/>
+          </a:xfrm>
+          <a:prstGeom prst="rect">
+            <a:avLst/>
+          </a:prstGeom>
+          <a:noFill/>
+        </p:spPr>
+        <p:txBody>
+          <a:bodyPr wrap="square" rtlCol="0">
+            <a:spAutoFit/>
+          </a:bodyPr>
+          <a:lstStyle/>
+          <a:p>
+            <a:r>
+              <a:rPr lang="en-US" dirty="0" smtClean="0"/>
+              <a:t>T = 3, R = 0.1</a:t>
+            </a:r>
+            <a:endParaRPr lang="en-US" dirty="0"/>
+          </a:p>
+        </p:txBody>
+      </p:sp>
       <p:pic>
         <p:nvPicPr>
-          <p:cNvPr id="5" name="Picture 4"/>
+          <p:cNvPr id="6" name="Picture 5"/>
           <p:cNvPicPr>
             <a:picLocks noChangeAspect="1"/>
           </p:cNvPicPr>
@@ -4372,8 +4409,8 @@
         </p:blipFill>
         <p:spPr>
           <a:xfrm>
-            <a:off x="5739205" y="1857020"/>
-            <a:ext cx="5714435" cy="3457258"/>
+            <a:off x="6075605" y="1876022"/>
+            <a:ext cx="4649769" cy="3266133"/>
           </a:xfrm>
           <a:prstGeom prst="rect">
             <a:avLst/>
@@ -4382,14 +4419,14 @@
       </p:pic>
       <p:sp>
         <p:nvSpPr>
-          <p:cNvPr id="6" name="TextBox 5"/>
+          <p:cNvPr id="7" name="TextBox 6"/>
           <p:cNvSpPr txBox="1"/>
           <p:nvPr/>
         </p:nvSpPr>
         <p:spPr>
           <a:xfrm>
-            <a:off x="1575996" y="5394960"/>
-            <a:ext cx="3716767" cy="369332"/>
+            <a:off x="7091082" y="5434023"/>
+            <a:ext cx="3560781" cy="369332"/>
           </a:xfrm>
           <a:prstGeom prst="rect">
             <a:avLst/>
@@ -4404,37 +4441,7 @@
           <a:p>
             <a:r>
               <a:rPr lang="en-US" dirty="0" smtClean="0"/>
-              <a:t>1 point in outlier class</a:t>
-            </a:r>
-            <a:endParaRPr lang="en-US" dirty="0"/>
-          </a:p>
-        </p:txBody>
-      </p:sp>
-      <p:sp>
-        <p:nvSpPr>
-          <p:cNvPr id="8" name="TextBox 7"/>
-          <p:cNvSpPr txBox="1"/>
-          <p:nvPr/>
-        </p:nvSpPr>
-        <p:spPr>
-          <a:xfrm>
-            <a:off x="7290099" y="5394960"/>
-            <a:ext cx="3716767" cy="369332"/>
-          </a:xfrm>
-          <a:prstGeom prst="rect">
-            <a:avLst/>
-          </a:prstGeom>
-          <a:noFill/>
-        </p:spPr>
-        <p:txBody>
-          <a:bodyPr wrap="square" rtlCol="0">
-            <a:spAutoFit/>
-          </a:bodyPr>
-          <a:lstStyle/>
-          <a:p>
-            <a:r>
-              <a:rPr lang="en-US" dirty="0" smtClean="0"/>
-              <a:t>5 points in outlier class</a:t>
+              <a:t>T = 3, R = 0.01</a:t>
             </a:r>
             <a:endParaRPr lang="en-US" dirty="0"/>
           </a:p>
@@ -4443,7 +4450,7 @@
     </p:spTree>
     <p:extLst>
       <p:ext uri="{BB962C8B-B14F-4D97-AF65-F5344CB8AC3E}">
-        <p14:creationId xmlns:p14="http://schemas.microsoft.com/office/powerpoint/2010/main" val="3220221694"/>
+        <p14:creationId xmlns:p14="http://schemas.microsoft.com/office/powerpoint/2010/main" val="3995622137"/>
       </p:ext>
     </p:extLst>
   </p:cSld>
@@ -4494,6 +4501,346 @@
           <a:p>
             <a:r>
               <a:rPr lang="en-US" dirty="0" smtClean="0"/>
+              <a:t>K Nearest Neighbors Count</a:t>
+            </a:r>
+            <a:endParaRPr lang="en-US" dirty="0"/>
+          </a:p>
+        </p:txBody>
+      </p:sp>
+      <p:pic>
+        <p:nvPicPr>
+          <p:cNvPr id="4" name="Content Placeholder 3"/>
+          <p:cNvPicPr>
+            <a:picLocks noGrp="1" noChangeAspect="1"/>
+          </p:cNvPicPr>
+          <p:nvPr>
+            <p:ph idx="1"/>
+          </p:nvPr>
+        </p:nvPicPr>
+        <p:blipFill>
+          <a:blip r:embed="rId2"/>
+          <a:stretch>
+            <a:fillRect/>
+          </a:stretch>
+        </p:blipFill>
+        <p:spPr>
+          <a:xfrm>
+            <a:off x="1139437" y="1921567"/>
+            <a:ext cx="4723482" cy="3435697"/>
+          </a:xfrm>
+          <a:prstGeom prst="rect">
+            <a:avLst/>
+          </a:prstGeom>
+        </p:spPr>
+      </p:pic>
+      <p:sp>
+        <p:nvSpPr>
+          <p:cNvPr id="5" name="TextBox 4"/>
+          <p:cNvSpPr txBox="1"/>
+          <p:nvPr/>
+        </p:nvSpPr>
+        <p:spPr>
+          <a:xfrm>
+            <a:off x="2538805" y="5357264"/>
+            <a:ext cx="4130936" cy="369332"/>
+          </a:xfrm>
+          <a:prstGeom prst="rect">
+            <a:avLst/>
+          </a:prstGeom>
+          <a:noFill/>
+        </p:spPr>
+        <p:txBody>
+          <a:bodyPr wrap="square" rtlCol="0">
+            <a:spAutoFit/>
+          </a:bodyPr>
+          <a:lstStyle/>
+          <a:p>
+            <a:r>
+              <a:rPr lang="en-US" dirty="0" smtClean="0"/>
+              <a:t>k = 10, m = 5, d = 1.3</a:t>
+            </a:r>
+            <a:endParaRPr lang="en-US" dirty="0"/>
+          </a:p>
+        </p:txBody>
+      </p:sp>
+      <p:sp>
+        <p:nvSpPr>
+          <p:cNvPr id="6" name="TextBox 5"/>
+          <p:cNvSpPr txBox="1"/>
+          <p:nvPr/>
+        </p:nvSpPr>
+        <p:spPr>
+          <a:xfrm>
+            <a:off x="7967831" y="5356805"/>
+            <a:ext cx="4130936" cy="369332"/>
+          </a:xfrm>
+          <a:prstGeom prst="rect">
+            <a:avLst/>
+          </a:prstGeom>
+          <a:noFill/>
+        </p:spPr>
+        <p:txBody>
+          <a:bodyPr wrap="square" rtlCol="0">
+            <a:spAutoFit/>
+          </a:bodyPr>
+          <a:lstStyle/>
+          <a:p>
+            <a:r>
+              <a:rPr lang="en-US" dirty="0" smtClean="0"/>
+              <a:t>k = 10, m = 5, d = 1.6</a:t>
+            </a:r>
+            <a:endParaRPr lang="en-US" dirty="0"/>
+          </a:p>
+        </p:txBody>
+      </p:sp>
+      <p:pic>
+        <p:nvPicPr>
+          <p:cNvPr id="7" name="Picture 6"/>
+          <p:cNvPicPr>
+            <a:picLocks noChangeAspect="1"/>
+          </p:cNvPicPr>
+          <p:nvPr/>
+        </p:nvPicPr>
+        <p:blipFill>
+          <a:blip r:embed="rId3"/>
+          <a:stretch>
+            <a:fillRect/>
+          </a:stretch>
+        </p:blipFill>
+        <p:spPr>
+          <a:xfrm>
+            <a:off x="6429487" y="1921567"/>
+            <a:ext cx="4807972" cy="3435697"/>
+          </a:xfrm>
+          <a:prstGeom prst="rect">
+            <a:avLst/>
+          </a:prstGeom>
+        </p:spPr>
+      </p:pic>
+    </p:spTree>
+    <p:extLst>
+      <p:ext uri="{BB962C8B-B14F-4D97-AF65-F5344CB8AC3E}">
+        <p14:creationId xmlns:p14="http://schemas.microsoft.com/office/powerpoint/2010/main" val="1675615764"/>
+      </p:ext>
+    </p:extLst>
+  </p:cSld>
+  <p:clrMapOvr>
+    <a:masterClrMapping/>
+  </p:clrMapOvr>
+  <p:timing>
+    <p:tnLst>
+      <p:par>
+        <p:cTn id="1" dur="indefinite" restart="never" nodeType="tmRoot"/>
+      </p:par>
+    </p:tnLst>
+  </p:timing>
+</p:sld>
+</file>
+
+<file path=ppt/slides/slide7.xml><?xml version="1.0" encoding="utf-8"?>
+<p:sld xmlns:a="http://schemas.openxmlformats.org/drawingml/2006/main" xmlns:r="http://schemas.openxmlformats.org/officeDocument/2006/relationships" xmlns:p="http://schemas.openxmlformats.org/presentationml/2006/main">
+  <p:cSld>
+    <p:spTree>
+      <p:nvGrpSpPr>
+        <p:cNvPr id="1" name=""/>
+        <p:cNvGrpSpPr/>
+        <p:nvPr/>
+      </p:nvGrpSpPr>
+      <p:grpSpPr>
+        <a:xfrm>
+          <a:off x="0" y="0"/>
+          <a:ext cx="0" cy="0"/>
+          <a:chOff x="0" y="0"/>
+          <a:chExt cx="0" cy="0"/>
+        </a:xfrm>
+      </p:grpSpPr>
+      <p:sp>
+        <p:nvSpPr>
+          <p:cNvPr id="2" name="Title 1"/>
+          <p:cNvSpPr>
+            <a:spLocks noGrp="1"/>
+          </p:cNvSpPr>
+          <p:nvPr>
+            <p:ph type="title"/>
+          </p:nvPr>
+        </p:nvSpPr>
+        <p:spPr/>
+        <p:txBody>
+          <a:bodyPr/>
+          <a:lstStyle/>
+          <a:p>
+            <a:r>
+              <a:rPr lang="en-US" dirty="0" smtClean="0"/>
+              <a:t>Support Vector Machine - Iris</a:t>
+            </a:r>
+            <a:endParaRPr lang="en-US" dirty="0"/>
+          </a:p>
+        </p:txBody>
+      </p:sp>
+      <p:pic>
+        <p:nvPicPr>
+          <p:cNvPr id="4" name="Content Placeholder 3"/>
+          <p:cNvPicPr>
+            <a:picLocks noGrp="1" noChangeAspect="1"/>
+          </p:cNvPicPr>
+          <p:nvPr>
+            <p:ph idx="1"/>
+          </p:nvPr>
+        </p:nvPicPr>
+        <p:blipFill>
+          <a:blip r:embed="rId2"/>
+          <a:stretch>
+            <a:fillRect/>
+          </a:stretch>
+        </p:blipFill>
+        <p:spPr>
+          <a:xfrm>
+            <a:off x="168198" y="1857020"/>
+            <a:ext cx="5571007" cy="3313703"/>
+          </a:xfrm>
+          <a:prstGeom prst="rect">
+            <a:avLst/>
+          </a:prstGeom>
+        </p:spPr>
+      </p:pic>
+      <p:pic>
+        <p:nvPicPr>
+          <p:cNvPr id="5" name="Picture 4"/>
+          <p:cNvPicPr>
+            <a:picLocks noChangeAspect="1"/>
+          </p:cNvPicPr>
+          <p:nvPr/>
+        </p:nvPicPr>
+        <p:blipFill>
+          <a:blip r:embed="rId3"/>
+          <a:stretch>
+            <a:fillRect/>
+          </a:stretch>
+        </p:blipFill>
+        <p:spPr>
+          <a:xfrm>
+            <a:off x="5739205" y="1857020"/>
+            <a:ext cx="5714435" cy="3457258"/>
+          </a:xfrm>
+          <a:prstGeom prst="rect">
+            <a:avLst/>
+          </a:prstGeom>
+        </p:spPr>
+      </p:pic>
+      <p:sp>
+        <p:nvSpPr>
+          <p:cNvPr id="6" name="TextBox 5"/>
+          <p:cNvSpPr txBox="1"/>
+          <p:nvPr/>
+        </p:nvSpPr>
+        <p:spPr>
+          <a:xfrm>
+            <a:off x="1575996" y="5394960"/>
+            <a:ext cx="3716767" cy="369332"/>
+          </a:xfrm>
+          <a:prstGeom prst="rect">
+            <a:avLst/>
+          </a:prstGeom>
+          <a:noFill/>
+        </p:spPr>
+        <p:txBody>
+          <a:bodyPr wrap="square" rtlCol="0">
+            <a:spAutoFit/>
+          </a:bodyPr>
+          <a:lstStyle/>
+          <a:p>
+            <a:r>
+              <a:rPr lang="en-US" dirty="0" smtClean="0"/>
+              <a:t>1 point in outlier class</a:t>
+            </a:r>
+            <a:endParaRPr lang="en-US" dirty="0"/>
+          </a:p>
+        </p:txBody>
+      </p:sp>
+      <p:sp>
+        <p:nvSpPr>
+          <p:cNvPr id="8" name="TextBox 7"/>
+          <p:cNvSpPr txBox="1"/>
+          <p:nvPr/>
+        </p:nvSpPr>
+        <p:spPr>
+          <a:xfrm>
+            <a:off x="7290099" y="5394960"/>
+            <a:ext cx="3716767" cy="369332"/>
+          </a:xfrm>
+          <a:prstGeom prst="rect">
+            <a:avLst/>
+          </a:prstGeom>
+          <a:noFill/>
+        </p:spPr>
+        <p:txBody>
+          <a:bodyPr wrap="square" rtlCol="0">
+            <a:spAutoFit/>
+          </a:bodyPr>
+          <a:lstStyle/>
+          <a:p>
+            <a:r>
+              <a:rPr lang="en-US" dirty="0" smtClean="0"/>
+              <a:t>5 points in outlier class</a:t>
+            </a:r>
+            <a:endParaRPr lang="en-US" dirty="0"/>
+          </a:p>
+        </p:txBody>
+      </p:sp>
+    </p:spTree>
+    <p:extLst>
+      <p:ext uri="{BB962C8B-B14F-4D97-AF65-F5344CB8AC3E}">
+        <p14:creationId xmlns:p14="http://schemas.microsoft.com/office/powerpoint/2010/main" val="3220221694"/>
+      </p:ext>
+    </p:extLst>
+  </p:cSld>
+  <p:clrMapOvr>
+    <a:masterClrMapping/>
+  </p:clrMapOvr>
+  <p:timing>
+    <p:tnLst>
+      <p:par>
+        <p:cTn id="1" dur="indefinite" restart="never" nodeType="tmRoot"/>
+      </p:par>
+    </p:tnLst>
+  </p:timing>
+</p:sld>
+</file>
+
+<file path=ppt/slides/slide8.xml><?xml version="1.0" encoding="utf-8"?>
+<p:sld xmlns:a="http://schemas.openxmlformats.org/drawingml/2006/main" xmlns:r="http://schemas.openxmlformats.org/officeDocument/2006/relationships" xmlns:p="http://schemas.openxmlformats.org/presentationml/2006/main">
+  <p:cSld>
+    <p:spTree>
+      <p:nvGrpSpPr>
+        <p:cNvPr id="1" name=""/>
+        <p:cNvGrpSpPr/>
+        <p:nvPr/>
+      </p:nvGrpSpPr>
+      <p:grpSpPr>
+        <a:xfrm>
+          <a:off x="0" y="0"/>
+          <a:ext cx="0" cy="0"/>
+          <a:chOff x="0" y="0"/>
+          <a:chExt cx="0" cy="0"/>
+        </a:xfrm>
+      </p:grpSpPr>
+      <p:sp>
+        <p:nvSpPr>
+          <p:cNvPr id="2" name="Title 1"/>
+          <p:cNvSpPr>
+            <a:spLocks noGrp="1"/>
+          </p:cNvSpPr>
+          <p:nvPr>
+            <p:ph type="title"/>
+          </p:nvPr>
+        </p:nvSpPr>
+        <p:spPr/>
+        <p:txBody>
+          <a:bodyPr/>
+          <a:lstStyle/>
+          <a:p>
+            <a:r>
+              <a:rPr lang="en-US" dirty="0" smtClean="0"/>
               <a:t>To Get Code For:</a:t>
             </a:r>
             <a:endParaRPr lang="en-US" dirty="0"/>
@@ -4517,19 +4864,11 @@
           <a:p>
             <a:r>
               <a:rPr lang="en-US" dirty="0" smtClean="0"/>
-              <a:t>K Nearest Neighbors</a:t>
-            </a:r>
-          </a:p>
-          <a:p>
+              <a:t>Bayesian </a:t>
+            </a:r>
             <a:r>
               <a:rPr lang="en-US" dirty="0" smtClean="0"/>
-              <a:t>K Means</a:t>
-            </a:r>
-          </a:p>
-          <a:p>
-            <a:r>
-              <a:rPr lang="en-US" dirty="0" smtClean="0"/>
-              <a:t>Bayesian Network/Random Forest</a:t>
+              <a:t>Network/Random Forest</a:t>
             </a:r>
             <a:endParaRPr lang="en-US" dirty="0"/>
           </a:p>

</xml_diff>